<commit_message>
2026/02/24 : - update 25, exo 33 : deux versions de validate(), GET vs POST
</commit_message>
<xml_diff>
--- a/syllabus/25_intégration_NoSQL/syllabus_25_intégration_nosql.pptx
+++ b/syllabus/25_intégration_NoSQL/syllabus_25_intégration_nosql.pptx
@@ -5,7 +5,7 @@
     <p:sldMasterId id="2147483855" r:id="rId1"/>
   </p:sldMasterIdLst>
   <p:notesMasterIdLst>
-    <p:notesMasterId r:id="rId23"/>
+    <p:notesMasterId r:id="rId25"/>
   </p:notesMasterIdLst>
   <p:sldIdLst>
     <p:sldId id="416" r:id="rId2"/>
@@ -29,6 +29,8 @@
     <p:sldId id="661" r:id="rId20"/>
     <p:sldId id="659" r:id="rId21"/>
     <p:sldId id="660" r:id="rId22"/>
+    <p:sldId id="662" r:id="rId23"/>
+    <p:sldId id="663" r:id="rId24"/>
   </p:sldIdLst>
   <p:sldSz cx="12192000" cy="6858000"/>
   <p:notesSz cx="6858000" cy="9144000"/>
@@ -170,6 +172,8 @@
             <p14:sldId id="661"/>
             <p14:sldId id="659"/>
             <p14:sldId id="660"/>
+            <p14:sldId id="662"/>
+            <p14:sldId id="663"/>
           </p14:sldIdLst>
         </p14:section>
       </p14:sectionLst>
@@ -1025,6 +1029,306 @@
         </p:txBody>
       </p:sp>
     </p:spTree>
+  </p:cSld>
+  <p:clrMapOvr>
+    <a:masterClrMapping/>
+  </p:clrMapOvr>
+</p:notes>
+</file>
+
+<file path=ppt/notesSlides/notesSlide4.xml><?xml version="1.0" encoding="utf-8"?>
+<p:notes xmlns:a="http://schemas.openxmlformats.org/drawingml/2006/main" xmlns:r="http://schemas.openxmlformats.org/officeDocument/2006/relationships" xmlns:p="http://schemas.openxmlformats.org/presentationml/2006/main">
+  <p:cSld>
+    <p:spTree>
+      <p:nvGrpSpPr>
+        <p:cNvPr id="1" name=""/>
+        <p:cNvGrpSpPr/>
+        <p:nvPr/>
+      </p:nvGrpSpPr>
+      <p:grpSpPr>
+        <a:xfrm>
+          <a:off x="0" y="0"/>
+          <a:ext cx="0" cy="0"/>
+          <a:chOff x="0" y="0"/>
+          <a:chExt cx="0" cy="0"/>
+        </a:xfrm>
+      </p:grpSpPr>
+      <p:sp>
+        <p:nvSpPr>
+          <p:cNvPr id="2" name="Espace réservé de l'image des diapositives 1"/>
+          <p:cNvSpPr>
+            <a:spLocks noGrp="1" noRot="1" noChangeAspect="1"/>
+          </p:cNvSpPr>
+          <p:nvPr>
+            <p:ph type="sldImg"/>
+          </p:nvPr>
+        </p:nvSpPr>
+        <p:spPr/>
+      </p:sp>
+      <p:sp>
+        <p:nvSpPr>
+          <p:cNvPr id="3" name="Espace réservé des notes 2"/>
+          <p:cNvSpPr>
+            <a:spLocks noGrp="1"/>
+          </p:cNvSpPr>
+          <p:nvPr>
+            <p:ph type="body" idx="1"/>
+          </p:nvPr>
+        </p:nvSpPr>
+        <p:spPr/>
+        <p:txBody>
+          <a:bodyPr/>
+          <a:lstStyle/>
+          <a:p>
+            <a:endParaRPr lang="fr-BE"/>
+          </a:p>
+        </p:txBody>
+      </p:sp>
+      <p:sp>
+        <p:nvSpPr>
+          <p:cNvPr id="4" name="Espace réservé du numéro de diapositive 3"/>
+          <p:cNvSpPr>
+            <a:spLocks noGrp="1"/>
+          </p:cNvSpPr>
+          <p:nvPr>
+            <p:ph type="sldNum" sz="quarter" idx="5"/>
+          </p:nvPr>
+        </p:nvSpPr>
+        <p:spPr/>
+        <p:txBody>
+          <a:bodyPr/>
+          <a:lstStyle/>
+          <a:p>
+            <a:fld id="{0E3842A0-1A3F-4998-8237-CE5EEE5DFDF0}" type="slidenum">
+              <a:rPr lang="fr-BE" smtClean="0"/>
+              <a:t>21</a:t>
+            </a:fld>
+            <a:endParaRPr lang="fr-BE"/>
+          </a:p>
+        </p:txBody>
+      </p:sp>
+    </p:spTree>
+    <p:extLst>
+      <p:ext uri="{BB962C8B-B14F-4D97-AF65-F5344CB8AC3E}">
+        <p14:creationId xmlns:p14="http://schemas.microsoft.com/office/powerpoint/2010/main" val="2554308113"/>
+      </p:ext>
+    </p:extLst>
+  </p:cSld>
+  <p:clrMapOvr>
+    <a:masterClrMapping/>
+  </p:clrMapOvr>
+</p:notes>
+</file>
+
+<file path=ppt/notesSlides/notesSlide5.xml><?xml version="1.0" encoding="utf-8"?>
+<p:notes xmlns:a="http://schemas.openxmlformats.org/drawingml/2006/main" xmlns:r="http://schemas.openxmlformats.org/officeDocument/2006/relationships" xmlns:p="http://schemas.openxmlformats.org/presentationml/2006/main">
+  <p:cSld>
+    <p:spTree>
+      <p:nvGrpSpPr>
+        <p:cNvPr id="1" name="">
+          <a:extLst>
+            <a:ext uri="{FF2B5EF4-FFF2-40B4-BE49-F238E27FC236}">
+              <a16:creationId xmlns:a16="http://schemas.microsoft.com/office/drawing/2014/main" id="{1E212773-0E16-8ED2-9341-A6B9FF3FF315}"/>
+            </a:ext>
+          </a:extLst>
+        </p:cNvPr>
+        <p:cNvGrpSpPr/>
+        <p:nvPr/>
+      </p:nvGrpSpPr>
+      <p:grpSpPr>
+        <a:xfrm>
+          <a:off x="0" y="0"/>
+          <a:ext cx="0" cy="0"/>
+          <a:chOff x="0" y="0"/>
+          <a:chExt cx="0" cy="0"/>
+        </a:xfrm>
+      </p:grpSpPr>
+      <p:sp>
+        <p:nvSpPr>
+          <p:cNvPr id="2" name="Espace réservé de l'image des diapositives 1">
+            <a:extLst>
+              <a:ext uri="{FF2B5EF4-FFF2-40B4-BE49-F238E27FC236}">
+                <a16:creationId xmlns:a16="http://schemas.microsoft.com/office/drawing/2014/main" id="{15D5B0D8-0063-7DA8-46AE-66A6C305DBA3}"/>
+              </a:ext>
+            </a:extLst>
+          </p:cNvPr>
+          <p:cNvSpPr>
+            <a:spLocks noGrp="1" noRot="1" noChangeAspect="1"/>
+          </p:cNvSpPr>
+          <p:nvPr>
+            <p:ph type="sldImg"/>
+          </p:nvPr>
+        </p:nvSpPr>
+        <p:spPr/>
+      </p:sp>
+      <p:sp>
+        <p:nvSpPr>
+          <p:cNvPr id="3" name="Espace réservé des notes 2">
+            <a:extLst>
+              <a:ext uri="{FF2B5EF4-FFF2-40B4-BE49-F238E27FC236}">
+                <a16:creationId xmlns:a16="http://schemas.microsoft.com/office/drawing/2014/main" id="{A317A8BC-ADD1-572D-D390-9CA630A14AB3}"/>
+              </a:ext>
+            </a:extLst>
+          </p:cNvPr>
+          <p:cNvSpPr>
+            <a:spLocks noGrp="1"/>
+          </p:cNvSpPr>
+          <p:nvPr>
+            <p:ph type="body" idx="1"/>
+          </p:nvPr>
+        </p:nvSpPr>
+        <p:spPr/>
+        <p:txBody>
+          <a:bodyPr/>
+          <a:lstStyle/>
+          <a:p>
+            <a:endParaRPr lang="fr-BE"/>
+          </a:p>
+        </p:txBody>
+      </p:sp>
+      <p:sp>
+        <p:nvSpPr>
+          <p:cNvPr id="4" name="Espace réservé du numéro de diapositive 3">
+            <a:extLst>
+              <a:ext uri="{FF2B5EF4-FFF2-40B4-BE49-F238E27FC236}">
+                <a16:creationId xmlns:a16="http://schemas.microsoft.com/office/drawing/2014/main" id="{02B47EC4-24E1-FFBF-CD19-206ED1F6F440}"/>
+              </a:ext>
+            </a:extLst>
+          </p:cNvPr>
+          <p:cNvSpPr>
+            <a:spLocks noGrp="1"/>
+          </p:cNvSpPr>
+          <p:nvPr>
+            <p:ph type="sldNum" sz="quarter" idx="5"/>
+          </p:nvPr>
+        </p:nvSpPr>
+        <p:spPr/>
+        <p:txBody>
+          <a:bodyPr/>
+          <a:lstStyle/>
+          <a:p>
+            <a:fld id="{0E3842A0-1A3F-4998-8237-CE5EEE5DFDF0}" type="slidenum">
+              <a:rPr lang="fr-BE" smtClean="0"/>
+              <a:t>22</a:t>
+            </a:fld>
+            <a:endParaRPr lang="fr-BE"/>
+          </a:p>
+        </p:txBody>
+      </p:sp>
+    </p:spTree>
+    <p:extLst>
+      <p:ext uri="{BB962C8B-B14F-4D97-AF65-F5344CB8AC3E}">
+        <p14:creationId xmlns:p14="http://schemas.microsoft.com/office/powerpoint/2010/main" val="482934535"/>
+      </p:ext>
+    </p:extLst>
+  </p:cSld>
+  <p:clrMapOvr>
+    <a:masterClrMapping/>
+  </p:clrMapOvr>
+</p:notes>
+</file>
+
+<file path=ppt/notesSlides/notesSlide6.xml><?xml version="1.0" encoding="utf-8"?>
+<p:notes xmlns:a="http://schemas.openxmlformats.org/drawingml/2006/main" xmlns:r="http://schemas.openxmlformats.org/officeDocument/2006/relationships" xmlns:p="http://schemas.openxmlformats.org/presentationml/2006/main">
+  <p:cSld>
+    <p:spTree>
+      <p:nvGrpSpPr>
+        <p:cNvPr id="1" name="">
+          <a:extLst>
+            <a:ext uri="{FF2B5EF4-FFF2-40B4-BE49-F238E27FC236}">
+              <a16:creationId xmlns:a16="http://schemas.microsoft.com/office/drawing/2014/main" id="{FC1819A1-169B-8D8A-C305-C7A78D543E54}"/>
+            </a:ext>
+          </a:extLst>
+        </p:cNvPr>
+        <p:cNvGrpSpPr/>
+        <p:nvPr/>
+      </p:nvGrpSpPr>
+      <p:grpSpPr>
+        <a:xfrm>
+          <a:off x="0" y="0"/>
+          <a:ext cx="0" cy="0"/>
+          <a:chOff x="0" y="0"/>
+          <a:chExt cx="0" cy="0"/>
+        </a:xfrm>
+      </p:grpSpPr>
+      <p:sp>
+        <p:nvSpPr>
+          <p:cNvPr id="2" name="Espace réservé de l'image des diapositives 1">
+            <a:extLst>
+              <a:ext uri="{FF2B5EF4-FFF2-40B4-BE49-F238E27FC236}">
+                <a16:creationId xmlns:a16="http://schemas.microsoft.com/office/drawing/2014/main" id="{51A20571-4F79-5579-74C8-649A0FC14B37}"/>
+              </a:ext>
+            </a:extLst>
+          </p:cNvPr>
+          <p:cNvSpPr>
+            <a:spLocks noGrp="1" noRot="1" noChangeAspect="1"/>
+          </p:cNvSpPr>
+          <p:nvPr>
+            <p:ph type="sldImg"/>
+          </p:nvPr>
+        </p:nvSpPr>
+        <p:spPr/>
+      </p:sp>
+      <p:sp>
+        <p:nvSpPr>
+          <p:cNvPr id="3" name="Espace réservé des notes 2">
+            <a:extLst>
+              <a:ext uri="{FF2B5EF4-FFF2-40B4-BE49-F238E27FC236}">
+                <a16:creationId xmlns:a16="http://schemas.microsoft.com/office/drawing/2014/main" id="{1F192B63-F7EA-190B-B782-E3891FCF9648}"/>
+              </a:ext>
+            </a:extLst>
+          </p:cNvPr>
+          <p:cNvSpPr>
+            <a:spLocks noGrp="1"/>
+          </p:cNvSpPr>
+          <p:nvPr>
+            <p:ph type="body" idx="1"/>
+          </p:nvPr>
+        </p:nvSpPr>
+        <p:spPr/>
+        <p:txBody>
+          <a:bodyPr/>
+          <a:lstStyle/>
+          <a:p>
+            <a:endParaRPr lang="fr-BE"/>
+          </a:p>
+        </p:txBody>
+      </p:sp>
+      <p:sp>
+        <p:nvSpPr>
+          <p:cNvPr id="4" name="Espace réservé du numéro de diapositive 3">
+            <a:extLst>
+              <a:ext uri="{FF2B5EF4-FFF2-40B4-BE49-F238E27FC236}">
+                <a16:creationId xmlns:a16="http://schemas.microsoft.com/office/drawing/2014/main" id="{5E761B82-3DF3-D1F2-3953-3F55EED0C959}"/>
+              </a:ext>
+            </a:extLst>
+          </p:cNvPr>
+          <p:cNvSpPr>
+            <a:spLocks noGrp="1"/>
+          </p:cNvSpPr>
+          <p:nvPr>
+            <p:ph type="sldNum" sz="quarter" idx="5"/>
+          </p:nvPr>
+        </p:nvSpPr>
+        <p:spPr/>
+        <p:txBody>
+          <a:bodyPr/>
+          <a:lstStyle/>
+          <a:p>
+            <a:fld id="{0E3842A0-1A3F-4998-8237-CE5EEE5DFDF0}" type="slidenum">
+              <a:rPr lang="fr-BE" smtClean="0"/>
+              <a:t>23</a:t>
+            </a:fld>
+            <a:endParaRPr lang="fr-BE"/>
+          </a:p>
+        </p:txBody>
+      </p:sp>
+    </p:spTree>
+    <p:extLst>
+      <p:ext uri="{BB962C8B-B14F-4D97-AF65-F5344CB8AC3E}">
+        <p14:creationId xmlns:p14="http://schemas.microsoft.com/office/powerpoint/2010/main" val="721327428"/>
+      </p:ext>
+    </p:extLst>
   </p:cSld>
   <p:clrMapOvr>
     <a:masterClrMapping/>
@@ -5361,7 +5665,7 @@
         <p14:reveal/>
       </p:transition>
     </mc:Choice>
-    <mc:Fallback xmlns="" xmlns:mv="urn:schemas-microsoft-com:mac:vml" xmlns:c="http://schemas.openxmlformats.org/drawingml/2006/chart" xmlns:dgm="http://schemas.openxmlformats.org/drawingml/2006/diagram" xmlns:o="urn:schemas-microsoft-com:office:office" xmlns:v="urn:schemas-microsoft-com:vml" xmlns:pvml="urn:schemas-microsoft-com:office:powerpoint" xmlns:com="http://schemas.openxmlformats.org/drawingml/2006/compatibility" xmlns:p15="http://schemas.microsoft.com/office/powerpoint/2012/main" xmlns:ahyp="http://schemas.microsoft.com/office/drawing/2018/hyperlinkcolor">
+    <mc:Fallback xmlns:ahyp="http://schemas.microsoft.com/office/drawing/2018/hyperlinkcolor" xmlns:p15="http://schemas.microsoft.com/office/powerpoint/2012/main" xmlns:com="http://schemas.openxmlformats.org/drawingml/2006/compatibility" xmlns:pvml="urn:schemas-microsoft-com:office:powerpoint" xmlns:v="urn:schemas-microsoft-com:vml" xmlns:o="urn:schemas-microsoft-com:office:office" xmlns:dgm="http://schemas.openxmlformats.org/drawingml/2006/diagram" xmlns:c="http://schemas.openxmlformats.org/drawingml/2006/chart" xmlns:mv="urn:schemas-microsoft-com:mac:vml" xmlns="">
       <p:transition spd="med">
         <p:fade/>
       </p:transition>
@@ -7623,7 +7927,7 @@
         <p14:reveal/>
       </p:transition>
     </mc:Choice>
-    <mc:Fallback xmlns:ahyp="http://schemas.microsoft.com/office/drawing/2018/hyperlinkcolor" xmlns:p15="http://schemas.microsoft.com/office/powerpoint/2012/main" xmlns:com="http://schemas.openxmlformats.org/drawingml/2006/compatibility" xmlns:pvml="urn:schemas-microsoft-com:office:powerpoint" xmlns:v="urn:schemas-microsoft-com:vml" xmlns:o="urn:schemas-microsoft-com:office:office" xmlns:dgm="http://schemas.openxmlformats.org/drawingml/2006/diagram" xmlns:c="http://schemas.openxmlformats.org/drawingml/2006/chart" xmlns:mv="urn:schemas-microsoft-com:mac:vml" xmlns="">
+    <mc:Fallback xmlns="" xmlns:mv="urn:schemas-microsoft-com:mac:vml" xmlns:c="http://schemas.openxmlformats.org/drawingml/2006/chart" xmlns:dgm="http://schemas.openxmlformats.org/drawingml/2006/diagram" xmlns:o="urn:schemas-microsoft-com:office:office" xmlns:v="urn:schemas-microsoft-com:vml" xmlns:pvml="urn:schemas-microsoft-com:office:powerpoint" xmlns:com="http://schemas.openxmlformats.org/drawingml/2006/compatibility" xmlns:p15="http://schemas.microsoft.com/office/powerpoint/2012/main" xmlns:ahyp="http://schemas.microsoft.com/office/drawing/2018/hyperlinkcolor">
       <p:transition spd="med">
         <p:fade/>
       </p:transition>
@@ -7885,14 +8189,14 @@
           </a:xfrm>
         </p:spPr>
         <p:txBody>
-          <a:bodyPr numCol="2">
+          <a:bodyPr numCol="2" spcCol="180000">
             <a:normAutofit/>
           </a:bodyPr>
           <a:lstStyle/>
           <a:p>
             <a:r>
               <a:rPr lang="fr-BE"/>
-              <a:t>Partez du chapitre 22, exo 28.</a:t>
+              <a:t>Corollaire à chap. 22, exo 24.</a:t>
             </a:r>
           </a:p>
           <a:p>
@@ -7931,33 +8235,37 @@
           <a:p>
             <a:r>
               <a:rPr lang="fr-BE"/>
+              <a:t>Mais </a:t>
+            </a:r>
+          </a:p>
+          <a:p>
+            <a:pPr lvl="1"/>
+            <a:r>
+              <a:rPr lang="fr-BE"/>
               <a:t>Validation sur un serveur extérieur</a:t>
             </a:r>
-            <a:br>
-              <a:rPr lang="fr-BE"/>
-            </a:br>
-            <a:endParaRPr lang="fr-BE"/>
+          </a:p>
+          <a:p>
+            <a:r>
+              <a:rPr lang="fr-BE"/>
+              <a:t>Envoi des données</a:t>
+            </a:r>
           </a:p>
           <a:p>
             <a:pPr lvl="1"/>
             <a:r>
               <a:rPr lang="fr-BE"/>
-              <a:t>URI : </a:t>
-            </a:r>
-            <a:r>
-              <a:rPr lang="fr-BE" sz="2200">
-                <a:solidFill>
-                  <a:schemeClr val="accent6">
-                    <a:lumMod val="50000"/>
-                  </a:schemeClr>
-                </a:solidFill>
-                <a:latin typeface="Consolas" panose="020B0609020204030204" pitchFamily="49" charset="0"/>
-              </a:rPr>
-              <a:t>http://playground.burotix.be/login/ ? login=&lt;login&gt; &amp; passwd=&lt;passwd</a:t>
+              <a:t>GET : simple</a:t>
             </a:r>
           </a:p>
           <a:p>
             <a:pPr lvl="1"/>
+            <a:r>
+              <a:rPr lang="fr-BE"/>
+              <a:t>POST : sécurisé</a:t>
+            </a:r>
+          </a:p>
+          <a:p>
             <a:r>
               <a:rPr lang="fr-BE"/>
               <a:t>Retour : format JSON</a:t>
@@ -8062,6 +8370,484 @@
       </p:transition>
     </mc:Choice>
     <mc:Fallback xmlns="">
+      <p:transition spd="slow">
+        <p:fade/>
+      </p:transition>
+    </mc:Fallback>
+  </mc:AlternateContent>
+</p:sld>
+</file>
+
+<file path=ppt/slides/slide22.xml><?xml version="1.0" encoding="utf-8"?>
+<p:sld xmlns:a="http://schemas.openxmlformats.org/drawingml/2006/main" xmlns:r="http://schemas.openxmlformats.org/officeDocument/2006/relationships" xmlns:p="http://schemas.openxmlformats.org/presentationml/2006/main">
+  <p:cSld>
+    <p:spTree>
+      <p:nvGrpSpPr>
+        <p:cNvPr id="1" name="">
+          <a:extLst>
+            <a:ext uri="{FF2B5EF4-FFF2-40B4-BE49-F238E27FC236}">
+              <a16:creationId xmlns:a16="http://schemas.microsoft.com/office/drawing/2014/main" id="{29F6ABA0-D1F2-46AC-FF70-344606AAB9D6}"/>
+            </a:ext>
+          </a:extLst>
+        </p:cNvPr>
+        <p:cNvGrpSpPr/>
+        <p:nvPr/>
+      </p:nvGrpSpPr>
+      <p:grpSpPr>
+        <a:xfrm>
+          <a:off x="0" y="0"/>
+          <a:ext cx="0" cy="0"/>
+          <a:chOff x="0" y="0"/>
+          <a:chExt cx="0" cy="0"/>
+        </a:xfrm>
+      </p:grpSpPr>
+      <p:sp>
+        <p:nvSpPr>
+          <p:cNvPr id="2" name="Titre 1">
+            <a:extLst>
+              <a:ext uri="{FF2B5EF4-FFF2-40B4-BE49-F238E27FC236}">
+                <a16:creationId xmlns:a16="http://schemas.microsoft.com/office/drawing/2014/main" id="{E9995020-009C-EE96-650C-E420BCD70389}"/>
+              </a:ext>
+            </a:extLst>
+          </p:cNvPr>
+          <p:cNvSpPr>
+            <a:spLocks noGrp="1"/>
+          </p:cNvSpPr>
+          <p:nvPr>
+            <p:ph type="title"/>
+          </p:nvPr>
+        </p:nvSpPr>
+        <p:spPr>
+          <a:xfrm>
+            <a:off x="838200" y="365125"/>
+            <a:ext cx="10515600" cy="1325563"/>
+          </a:xfrm>
+        </p:spPr>
+        <p:txBody>
+          <a:bodyPr/>
+          <a:lstStyle/>
+          <a:p>
+            <a:r>
+              <a:rPr lang="fr-BE"/>
+              <a:t>Exo 33 : log-in, log-out avec API et JSON</a:t>
+            </a:r>
+          </a:p>
+        </p:txBody>
+      </p:sp>
+      <p:sp>
+        <p:nvSpPr>
+          <p:cNvPr id="3" name="Espace réservé du contenu 2">
+            <a:extLst>
+              <a:ext uri="{FF2B5EF4-FFF2-40B4-BE49-F238E27FC236}">
+                <a16:creationId xmlns:a16="http://schemas.microsoft.com/office/drawing/2014/main" id="{FBAEE1D2-3EF7-2C2F-4040-00F5D692B4CE}"/>
+              </a:ext>
+            </a:extLst>
+          </p:cNvPr>
+          <p:cNvSpPr>
+            <a:spLocks noGrp="1"/>
+          </p:cNvSpPr>
+          <p:nvPr>
+            <p:ph idx="1"/>
+          </p:nvPr>
+        </p:nvSpPr>
+        <p:spPr>
+          <a:xfrm>
+            <a:off x="838200" y="1690689"/>
+            <a:ext cx="10515600" cy="4486276"/>
+          </a:xfrm>
+        </p:spPr>
+        <p:txBody>
+          <a:bodyPr numCol="1" spcCol="180000">
+            <a:normAutofit/>
+          </a:bodyPr>
+          <a:lstStyle/>
+          <a:p>
+            <a:r>
+              <a:rPr lang="fr-BE"/>
+              <a:t>Envoi des données GET  : </a:t>
+            </a:r>
+            <a:r>
+              <a:rPr lang="fr-BE">
+                <a:solidFill>
+                  <a:srgbClr val="996633"/>
+                </a:solidFill>
+                <a:latin typeface="Consolas" panose="020B0609020204030204" pitchFamily="49" charset="0"/>
+              </a:rPr>
+              <a:t>validate_get()</a:t>
+            </a:r>
+          </a:p>
+          <a:p>
+            <a:pPr lvl="1"/>
+            <a:r>
+              <a:rPr lang="fr-BE"/>
+              <a:t>construire un URL tel que </a:t>
+            </a:r>
+            <a:br>
+              <a:rPr lang="fr-BE"/>
+            </a:br>
+            <a:r>
+              <a:rPr lang="fr-BE">
+                <a:solidFill>
+                  <a:srgbClr val="996633"/>
+                </a:solidFill>
+                <a:latin typeface="Consolas" panose="020B0609020204030204" pitchFamily="49" charset="0"/>
+              </a:rPr>
+              <a:t>http://….php?login=user&amp;passwd=user</a:t>
+            </a:r>
+            <a:br>
+              <a:rPr lang="fr-BE">
+                <a:solidFill>
+                  <a:srgbClr val="996633"/>
+                </a:solidFill>
+                <a:latin typeface="Consolas" panose="020B0609020204030204" pitchFamily="49" charset="0"/>
+              </a:rPr>
+            </a:br>
+            <a:r>
+              <a:rPr lang="fr-BE"/>
+              <a:t>avec </a:t>
+            </a:r>
+            <a:r>
+              <a:rPr lang="fr-BE">
+                <a:solidFill>
+                  <a:srgbClr val="996633"/>
+                </a:solidFill>
+                <a:latin typeface="Consolas" panose="020B0609020204030204" pitchFamily="49" charset="0"/>
+              </a:rPr>
+              <a:t>http_build_query()</a:t>
+            </a:r>
+          </a:p>
+          <a:p>
+            <a:pPr lvl="1"/>
+            <a:r>
+              <a:rPr lang="fr-BE"/>
+              <a:t>appeler </a:t>
+            </a:r>
+            <a:r>
+              <a:rPr lang="fr-BE">
+                <a:solidFill>
+                  <a:srgbClr val="996633"/>
+                </a:solidFill>
+                <a:latin typeface="Consolas" panose="020B0609020204030204" pitchFamily="49" charset="0"/>
+              </a:rPr>
+              <a:t>file_get_contents($uri)</a:t>
+            </a:r>
+          </a:p>
+          <a:p>
+            <a:pPr lvl="1"/>
+            <a:r>
+              <a:rPr lang="fr-BE"/>
+              <a:t>traiter le retour</a:t>
+            </a:r>
+          </a:p>
+        </p:txBody>
+      </p:sp>
+    </p:spTree>
+    <p:extLst>
+      <p:ext uri="{BB962C8B-B14F-4D97-AF65-F5344CB8AC3E}">
+        <p14:creationId xmlns:p14="http://schemas.microsoft.com/office/powerpoint/2010/main" val="3650656143"/>
+      </p:ext>
+    </p:extLst>
+  </p:cSld>
+  <p:clrMapOvr>
+    <a:masterClrMapping/>
+  </p:clrMapOvr>
+  <mc:AlternateContent xmlns:mc="http://schemas.openxmlformats.org/markup-compatibility/2006">
+    <mc:Choice xmlns:p14="http://schemas.microsoft.com/office/powerpoint/2010/main" Requires="p14">
+      <p:transition spd="slow">
+        <p14:reveal/>
+      </p:transition>
+    </mc:Choice>
+    <mc:Fallback>
+      <p:transition spd="slow">
+        <p:fade/>
+      </p:transition>
+    </mc:Fallback>
+  </mc:AlternateContent>
+</p:sld>
+</file>
+
+<file path=ppt/slides/slide23.xml><?xml version="1.0" encoding="utf-8"?>
+<p:sld xmlns:a="http://schemas.openxmlformats.org/drawingml/2006/main" xmlns:r="http://schemas.openxmlformats.org/officeDocument/2006/relationships" xmlns:p="http://schemas.openxmlformats.org/presentationml/2006/main">
+  <p:cSld>
+    <p:spTree>
+      <p:nvGrpSpPr>
+        <p:cNvPr id="1" name="">
+          <a:extLst>
+            <a:ext uri="{FF2B5EF4-FFF2-40B4-BE49-F238E27FC236}">
+              <a16:creationId xmlns:a16="http://schemas.microsoft.com/office/drawing/2014/main" id="{C3198FFF-1C03-9752-D476-01B008C48C9A}"/>
+            </a:ext>
+          </a:extLst>
+        </p:cNvPr>
+        <p:cNvGrpSpPr/>
+        <p:nvPr/>
+      </p:nvGrpSpPr>
+      <p:grpSpPr>
+        <a:xfrm>
+          <a:off x="0" y="0"/>
+          <a:ext cx="0" cy="0"/>
+          <a:chOff x="0" y="0"/>
+          <a:chExt cx="0" cy="0"/>
+        </a:xfrm>
+      </p:grpSpPr>
+      <p:sp>
+        <p:nvSpPr>
+          <p:cNvPr id="2" name="Titre 1">
+            <a:extLst>
+              <a:ext uri="{FF2B5EF4-FFF2-40B4-BE49-F238E27FC236}">
+                <a16:creationId xmlns:a16="http://schemas.microsoft.com/office/drawing/2014/main" id="{F06CEEA9-E54E-19BE-AB3F-33C7BA3007D2}"/>
+              </a:ext>
+            </a:extLst>
+          </p:cNvPr>
+          <p:cNvSpPr>
+            <a:spLocks noGrp="1"/>
+          </p:cNvSpPr>
+          <p:nvPr>
+            <p:ph type="title"/>
+          </p:nvPr>
+        </p:nvSpPr>
+        <p:spPr>
+          <a:xfrm>
+            <a:off x="838200" y="365125"/>
+            <a:ext cx="10515600" cy="1325563"/>
+          </a:xfrm>
+        </p:spPr>
+        <p:txBody>
+          <a:bodyPr/>
+          <a:lstStyle/>
+          <a:p>
+            <a:r>
+              <a:rPr lang="fr-BE"/>
+              <a:t>Exo 33 : log-in, log-out avec API et JSON</a:t>
+            </a:r>
+          </a:p>
+        </p:txBody>
+      </p:sp>
+      <p:sp>
+        <p:nvSpPr>
+          <p:cNvPr id="3" name="Espace réservé du contenu 2">
+            <a:extLst>
+              <a:ext uri="{FF2B5EF4-FFF2-40B4-BE49-F238E27FC236}">
+                <a16:creationId xmlns:a16="http://schemas.microsoft.com/office/drawing/2014/main" id="{9305E6DB-763C-4148-8F8E-43B7E3DE3399}"/>
+              </a:ext>
+            </a:extLst>
+          </p:cNvPr>
+          <p:cNvSpPr>
+            <a:spLocks noGrp="1"/>
+          </p:cNvSpPr>
+          <p:nvPr>
+            <p:ph idx="1"/>
+          </p:nvPr>
+        </p:nvSpPr>
+        <p:spPr>
+          <a:xfrm>
+            <a:off x="838200" y="1690688"/>
+            <a:ext cx="10515600" cy="5167311"/>
+          </a:xfrm>
+        </p:spPr>
+        <p:txBody>
+          <a:bodyPr numCol="1" spcCol="180000">
+            <a:normAutofit lnSpcReduction="10000"/>
+          </a:bodyPr>
+          <a:lstStyle/>
+          <a:p>
+            <a:r>
+              <a:rPr lang="fr-BE"/>
+              <a:t>Envoi des données POST : </a:t>
+            </a:r>
+            <a:r>
+              <a:rPr lang="fr-BE">
+                <a:solidFill>
+                  <a:srgbClr val="996633"/>
+                </a:solidFill>
+                <a:latin typeface="Consolas" panose="020B0609020204030204" pitchFamily="49" charset="0"/>
+              </a:rPr>
+              <a:t>validate_post()</a:t>
+            </a:r>
+            <a:endParaRPr lang="fr-BE"/>
+          </a:p>
+          <a:p>
+            <a:pPr lvl="1"/>
+            <a:r>
+              <a:rPr lang="fr-BE"/>
+              <a:t>URL tel que </a:t>
+            </a:r>
+            <a:r>
+              <a:rPr lang="fr-BE">
+                <a:solidFill>
+                  <a:srgbClr val="996633"/>
+                </a:solidFill>
+                <a:latin typeface="Consolas" panose="020B0609020204030204" pitchFamily="49" charset="0"/>
+              </a:rPr>
+              <a:t>https://….php</a:t>
+            </a:r>
+            <a:r>
+              <a:rPr lang="fr-BE"/>
+              <a:t> (sans param)</a:t>
+            </a:r>
+          </a:p>
+          <a:p>
+            <a:pPr lvl="1"/>
+            <a:r>
+              <a:rPr lang="fr-BE"/>
+              <a:t>URL param : idem GET </a:t>
+            </a:r>
+          </a:p>
+          <a:p>
+            <a:pPr lvl="1"/>
+            <a:r>
+              <a:rPr lang="fr-BE"/>
+              <a:t>créer un "contexte" tel que 	</a:t>
+            </a:r>
+            <a:r>
+              <a:rPr lang="fr-BE">
+                <a:solidFill>
+                  <a:srgbClr val="996633"/>
+                </a:solidFill>
+                <a:latin typeface="Consolas" panose="020B0609020204030204" pitchFamily="49" charset="0"/>
+              </a:rPr>
+              <a:t>	</a:t>
+            </a:r>
+            <a:br>
+              <a:rPr lang="fr-BE">
+                <a:solidFill>
+                  <a:srgbClr val="996633"/>
+                </a:solidFill>
+                <a:latin typeface="Consolas" panose="020B0609020204030204" pitchFamily="49" charset="0"/>
+              </a:rPr>
+            </a:br>
+            <a:r>
+              <a:rPr lang="fr-BE">
+                <a:solidFill>
+                  <a:srgbClr val="996633"/>
+                </a:solidFill>
+                <a:latin typeface="Consolas" panose="020B0609020204030204" pitchFamily="49" charset="0"/>
+              </a:rPr>
+              <a:t>   </a:t>
+            </a:r>
+            <a:r>
+              <a:rPr lang="en-US">
+                <a:solidFill>
+                  <a:srgbClr val="996633"/>
+                </a:solidFill>
+                <a:latin typeface="Consolas" panose="020B0609020204030204" pitchFamily="49" charset="0"/>
+              </a:rPr>
+              <a:t>"http" =&gt; [</a:t>
+            </a:r>
+            <a:br>
+              <a:rPr lang="en-US">
+                <a:solidFill>
+                  <a:srgbClr val="996633"/>
+                </a:solidFill>
+                <a:latin typeface="Consolas" panose="020B0609020204030204" pitchFamily="49" charset="0"/>
+              </a:rPr>
+            </a:br>
+            <a:r>
+              <a:rPr lang="en-US">
+                <a:solidFill>
+                  <a:srgbClr val="996633"/>
+                </a:solidFill>
+                <a:latin typeface="Consolas" panose="020B0609020204030204" pitchFamily="49" charset="0"/>
+              </a:rPr>
+              <a:t>       "method"  =&gt; "POST",</a:t>
+            </a:r>
+            <a:br>
+              <a:rPr lang="en-US">
+                <a:solidFill>
+                  <a:srgbClr val="996633"/>
+                </a:solidFill>
+                <a:latin typeface="Consolas" panose="020B0609020204030204" pitchFamily="49" charset="0"/>
+              </a:rPr>
+            </a:br>
+            <a:r>
+              <a:rPr lang="en-US">
+                <a:solidFill>
+                  <a:srgbClr val="996633"/>
+                </a:solidFill>
+                <a:latin typeface="Consolas" panose="020B0609020204030204" pitchFamily="49" charset="0"/>
+              </a:rPr>
+              <a:t>       "header"  =&gt; "Content-Type: …" .</a:t>
+            </a:r>
+            <a:br>
+              <a:rPr lang="en-US">
+                <a:solidFill>
+                  <a:srgbClr val="996633"/>
+                </a:solidFill>
+                <a:latin typeface="Consolas" panose="020B0609020204030204" pitchFamily="49" charset="0"/>
+              </a:rPr>
+            </a:br>
+            <a:r>
+              <a:rPr lang="en-US">
+                <a:solidFill>
+                  <a:srgbClr val="996633"/>
+                </a:solidFill>
+                <a:latin typeface="Consolas" panose="020B0609020204030204" pitchFamily="49" charset="0"/>
+              </a:rPr>
+              <a:t>       "content" =&gt; $uri_param_s,</a:t>
+            </a:r>
+            <a:br>
+              <a:rPr lang="en-US">
+                <a:solidFill>
+                  <a:srgbClr val="996633"/>
+                </a:solidFill>
+                <a:latin typeface="Consolas" panose="020B0609020204030204" pitchFamily="49" charset="0"/>
+              </a:rPr>
+            </a:br>
+            <a:r>
+              <a:rPr lang="en-US">
+                <a:solidFill>
+                  <a:srgbClr val="996633"/>
+                </a:solidFill>
+                <a:latin typeface="Consolas" panose="020B0609020204030204" pitchFamily="49" charset="0"/>
+              </a:rPr>
+              <a:t>   ]</a:t>
+            </a:r>
+          </a:p>
+          <a:p>
+            <a:pPr lvl="1"/>
+            <a:r>
+              <a:rPr lang="fr-BE"/>
+              <a:t>appeler </a:t>
+            </a:r>
+            <a:r>
+              <a:rPr lang="fr-BE">
+                <a:solidFill>
+                  <a:srgbClr val="996633"/>
+                </a:solidFill>
+                <a:latin typeface="Consolas" panose="020B0609020204030204" pitchFamily="49" charset="0"/>
+              </a:rPr>
+              <a:t>file_get_contents($uri, false, $context)</a:t>
+            </a:r>
+          </a:p>
+          <a:p>
+            <a:pPr lvl="1"/>
+            <a:r>
+              <a:rPr lang="fr-BE"/>
+              <a:t>traiter le retour</a:t>
+            </a:r>
+          </a:p>
+          <a:p>
+            <a:pPr lvl="1"/>
+            <a:endParaRPr lang="fr-BE"/>
+          </a:p>
+        </p:txBody>
+      </p:sp>
+    </p:spTree>
+    <p:extLst>
+      <p:ext uri="{BB962C8B-B14F-4D97-AF65-F5344CB8AC3E}">
+        <p14:creationId xmlns:p14="http://schemas.microsoft.com/office/powerpoint/2010/main" val="3641517469"/>
+      </p:ext>
+    </p:extLst>
+  </p:cSld>
+  <p:clrMapOvr>
+    <a:masterClrMapping/>
+  </p:clrMapOvr>
+  <mc:AlternateContent xmlns:mc="http://schemas.openxmlformats.org/markup-compatibility/2006">
+    <mc:Choice xmlns:p14="http://schemas.microsoft.com/office/powerpoint/2010/main" Requires="p14">
+      <p:transition spd="slow">
+        <p14:reveal/>
+      </p:transition>
+    </mc:Choice>
+    <mc:Fallback>
       <p:transition spd="slow">
         <p:fade/>
       </p:transition>

</xml_diff>